<commit_message>
Überarbeitung der Präsi - Beta für Freitag
Signed-off-by: MAG <mxthammel@gmail.com>
</commit_message>
<xml_diff>
--- a/Dokumente/Zwischenstand zum 2012 04 21 (2).pptx
+++ b/Dokumente/Zwischenstand zum 2012 04 21 (2).pptx
@@ -1219,18 +1219,18 @@
     </dgm:pt>
   </dgm:ptLst>
   <dgm:cxnLst>
+    <dgm:cxn modelId="{7FD82852-08D4-4757-9905-796C75187633}" type="presOf" srcId="{81593B52-C0C7-4699-A542-14EF6A552710}" destId="{4B16C956-3F43-4F0C-851B-7BEF2A858E05}" srcOrd="0" destOrd="0" presId="urn:microsoft.com/office/officeart/2005/8/layout/bProcess2"/>
+    <dgm:cxn modelId="{C0F0325B-5D94-4F8F-A19C-E342385C7A0C}" srcId="{2076FC96-6453-4C6E-A8B1-022AF85EFBBD}" destId="{D676ACFF-D864-4A74-BC08-FFF521911366}" srcOrd="3" destOrd="0" parTransId="{BC2BCB5C-0572-4291-A81A-4826CA359DAE}" sibTransId="{1C262E3B-E95B-4C81-A044-204E3F83EF9F}"/>
+    <dgm:cxn modelId="{7A1C7AB2-B278-4CD0-8D6D-33FAF07A3F85}" type="presOf" srcId="{9FFECB61-C811-496D-9F12-F63AD9A2D9EE}" destId="{EFBF5D05-10BD-4B08-8E78-F6A085231E0E}" srcOrd="0" destOrd="0" presId="urn:microsoft.com/office/officeart/2005/8/layout/bProcess2"/>
+    <dgm:cxn modelId="{4D2D03B2-4767-452A-A48D-FF809EF37E3B}" srcId="{2076FC96-6453-4C6E-A8B1-022AF85EFBBD}" destId="{3A8DBD30-33F4-4BF2-A3E8-CE2DB89DAAF3}" srcOrd="1" destOrd="0" parTransId="{CEAC2244-9C24-451F-BB9E-136E8D8A7A0B}" sibTransId="{63BBCC2C-BF04-4F97-9FC9-0D509448B1C6}"/>
     <dgm:cxn modelId="{617BCB0C-0558-407B-91AB-B68DE64BB2AA}" type="presOf" srcId="{944B7687-9390-4A1A-858A-D031F080161B}" destId="{756AB1AC-5B51-4BBE-B2B1-6ABFB74C10C9}" srcOrd="0" destOrd="0" presId="urn:microsoft.com/office/officeart/2005/8/layout/bProcess2"/>
-    <dgm:cxn modelId="{4D2D03B2-4767-452A-A48D-FF809EF37E3B}" srcId="{2076FC96-6453-4C6E-A8B1-022AF85EFBBD}" destId="{3A8DBD30-33F4-4BF2-A3E8-CE2DB89DAAF3}" srcOrd="1" destOrd="0" parTransId="{CEAC2244-9C24-451F-BB9E-136E8D8A7A0B}" sibTransId="{63BBCC2C-BF04-4F97-9FC9-0D509448B1C6}"/>
     <dgm:cxn modelId="{184BC419-765C-4FE3-8639-89B3ADAD51CC}" type="presOf" srcId="{D676ACFF-D864-4A74-BC08-FFF521911366}" destId="{FD93DD51-6B10-48A2-80F7-E1B001E1F8E7}" srcOrd="0" destOrd="0" presId="urn:microsoft.com/office/officeart/2005/8/layout/bProcess2"/>
-    <dgm:cxn modelId="{E10C5AF5-8470-4875-B217-C5D2EC0BEE27}" srcId="{2076FC96-6453-4C6E-A8B1-022AF85EFBBD}" destId="{9FFECB61-C811-496D-9F12-F63AD9A2D9EE}" srcOrd="2" destOrd="0" parTransId="{0267A443-BEBA-47C3-B13F-1D20BE53CED2}" sibTransId="{81593B52-C0C7-4699-A542-14EF6A552710}"/>
     <dgm:cxn modelId="{C8AACADD-D549-4CF7-A7F5-D30EBB8F3E5F}" type="presOf" srcId="{63BBCC2C-BF04-4F97-9FC9-0D509448B1C6}" destId="{6E2E45EE-058C-4AFF-8701-838DE3D5016A}" srcOrd="0" destOrd="0" presId="urn:microsoft.com/office/officeart/2005/8/layout/bProcess2"/>
     <dgm:cxn modelId="{DD228FCD-D43B-43E8-A775-DDFA3BD9C5C9}" type="presOf" srcId="{A2E957D4-B9A8-41E8-9B88-7B884721F996}" destId="{9AE0D100-B11F-4B8E-A83C-80C9BB67997D}" srcOrd="0" destOrd="0" presId="urn:microsoft.com/office/officeart/2005/8/layout/bProcess2"/>
-    <dgm:cxn modelId="{7FD82852-08D4-4757-9905-796C75187633}" type="presOf" srcId="{81593B52-C0C7-4699-A542-14EF6A552710}" destId="{4B16C956-3F43-4F0C-851B-7BEF2A858E05}" srcOrd="0" destOrd="0" presId="urn:microsoft.com/office/officeart/2005/8/layout/bProcess2"/>
+    <dgm:cxn modelId="{7BC55D47-D5B9-4E6B-A01C-32621EBC9EAA}" type="presOf" srcId="{2076FC96-6453-4C6E-A8B1-022AF85EFBBD}" destId="{4CB13BFB-EE5C-4952-BAC5-5317E8C7FD8A}" srcOrd="0" destOrd="0" presId="urn:microsoft.com/office/officeart/2005/8/layout/bProcess2"/>
+    <dgm:cxn modelId="{39710712-6FE3-476F-A0BC-24F557686F14}" srcId="{2076FC96-6453-4C6E-A8B1-022AF85EFBBD}" destId="{944B7687-9390-4A1A-858A-D031F080161B}" srcOrd="0" destOrd="0" parTransId="{388F90D2-8549-4567-8828-34D75B5A1121}" sibTransId="{A2E957D4-B9A8-41E8-9B88-7B884721F996}"/>
     <dgm:cxn modelId="{1FE1A904-067A-4EB4-A1BB-EEBD65BBABD7}" type="presOf" srcId="{3A8DBD30-33F4-4BF2-A3E8-CE2DB89DAAF3}" destId="{AE9493EE-4C7D-46D0-A28C-7598159ACE40}" srcOrd="0" destOrd="0" presId="urn:microsoft.com/office/officeart/2005/8/layout/bProcess2"/>
-    <dgm:cxn modelId="{7BC55D47-D5B9-4E6B-A01C-32621EBC9EAA}" type="presOf" srcId="{2076FC96-6453-4C6E-A8B1-022AF85EFBBD}" destId="{4CB13BFB-EE5C-4952-BAC5-5317E8C7FD8A}" srcOrd="0" destOrd="0" presId="urn:microsoft.com/office/officeart/2005/8/layout/bProcess2"/>
-    <dgm:cxn modelId="{C0F0325B-5D94-4F8F-A19C-E342385C7A0C}" srcId="{2076FC96-6453-4C6E-A8B1-022AF85EFBBD}" destId="{D676ACFF-D864-4A74-BC08-FFF521911366}" srcOrd="3" destOrd="0" parTransId="{BC2BCB5C-0572-4291-A81A-4826CA359DAE}" sibTransId="{1C262E3B-E95B-4C81-A044-204E3F83EF9F}"/>
-    <dgm:cxn modelId="{7A1C7AB2-B278-4CD0-8D6D-33FAF07A3F85}" type="presOf" srcId="{9FFECB61-C811-496D-9F12-F63AD9A2D9EE}" destId="{EFBF5D05-10BD-4B08-8E78-F6A085231E0E}" srcOrd="0" destOrd="0" presId="urn:microsoft.com/office/officeart/2005/8/layout/bProcess2"/>
-    <dgm:cxn modelId="{39710712-6FE3-476F-A0BC-24F557686F14}" srcId="{2076FC96-6453-4C6E-A8B1-022AF85EFBBD}" destId="{944B7687-9390-4A1A-858A-D031F080161B}" srcOrd="0" destOrd="0" parTransId="{388F90D2-8549-4567-8828-34D75B5A1121}" sibTransId="{A2E957D4-B9A8-41E8-9B88-7B884721F996}"/>
+    <dgm:cxn modelId="{E10C5AF5-8470-4875-B217-C5D2EC0BEE27}" srcId="{2076FC96-6453-4C6E-A8B1-022AF85EFBBD}" destId="{9FFECB61-C811-496D-9F12-F63AD9A2D9EE}" srcOrd="2" destOrd="0" parTransId="{0267A443-BEBA-47C3-B13F-1D20BE53CED2}" sibTransId="{81593B52-C0C7-4699-A542-14EF6A552710}"/>
     <dgm:cxn modelId="{AEAE39BD-4C94-41B0-8CE8-7BD544EC6AE1}" type="presParOf" srcId="{4CB13BFB-EE5C-4952-BAC5-5317E8C7FD8A}" destId="{756AB1AC-5B51-4BBE-B2B1-6ABFB74C10C9}" srcOrd="0" destOrd="0" presId="urn:microsoft.com/office/officeart/2005/8/layout/bProcess2"/>
     <dgm:cxn modelId="{749F995A-E309-412A-987F-CB1353CB2730}" type="presParOf" srcId="{4CB13BFB-EE5C-4952-BAC5-5317E8C7FD8A}" destId="{9AE0D100-B11F-4B8E-A83C-80C9BB67997D}" srcOrd="1" destOrd="0" presId="urn:microsoft.com/office/officeart/2005/8/layout/bProcess2"/>
     <dgm:cxn modelId="{2639D2DE-FB77-4886-AAFD-44C2A1A80029}" type="presParOf" srcId="{4CB13BFB-EE5C-4952-BAC5-5317E8C7FD8A}" destId="{A25C0F81-5BB3-4973-8F78-DEA3ED62347C}" srcOrd="2" destOrd="0" presId="urn:microsoft.com/office/officeart/2005/8/layout/bProcess2"/>
@@ -1247,14 +1247,14 @@
   <dgm:whole/>
   <dgm:extLst>
     <a:ext uri="http://schemas.microsoft.com/office/drawing/2008/diagram">
-      <dsp:dataModelExt xmlns:dsp="http://schemas.microsoft.com/office/drawing/2008/diagram" xmlns="" relId="rId7" minVer="http://schemas.openxmlformats.org/drawingml/2006/diagram"/>
+      <dsp:dataModelExt xmlns:dsp="http://schemas.microsoft.com/office/drawing/2008/diagram" relId="rId7" minVer="http://schemas.openxmlformats.org/drawingml/2006/diagram"/>
     </a:ext>
   </dgm:extLst>
 </dgm:dataModel>
 </file>
 
 <file path=ppt/diagrams/drawing1.xml><?xml version="1.0" encoding="utf-8"?>
-<dsp:drawing xmlns:dgm="http://schemas.openxmlformats.org/drawingml/2006/diagram" xmlns:a="http://schemas.openxmlformats.org/drawingml/2006/main" xmlns:dsp="http://schemas.microsoft.com/office/drawing/2008/diagram">
+<dsp:drawing xmlns:dgm="http://schemas.openxmlformats.org/drawingml/2006/diagram" xmlns:dsp="http://schemas.microsoft.com/office/drawing/2008/diagram" xmlns:a="http://schemas.openxmlformats.org/drawingml/2006/main">
   <dsp:spTree>
     <dsp:nvGrpSpPr>
       <dsp:cNvPr id="0" name=""/>
@@ -3113,7 +3113,7 @@
             <a:fld id="{31195639-3003-43D9-AD76-FA6B58D41938}" type="datetimeFigureOut">
               <a:rPr lang="de-DE" smtClean="0"/>
               <a:pPr/>
-              <a:t>18.04.2012</a:t>
+              <a:t>19.04.2012</a:t>
             </a:fld>
             <a:endParaRPr lang="de-DE"/>
           </a:p>
@@ -3284,7 +3284,7 @@
     </p:spTree>
     <p:extLst>
       <p:ext uri="{BB962C8B-B14F-4D97-AF65-F5344CB8AC3E}">
-        <p14:creationId xmlns:p14="http://schemas.microsoft.com/office/powerpoint/2010/main" xmlns="" val="1624034791"/>
+        <p14:creationId xmlns:p14="http://schemas.microsoft.com/office/powerpoint/2010/main" val="1624034791"/>
       </p:ext>
     </p:extLst>
   </p:cSld>
@@ -3425,15 +3425,59 @@
         </p:nvSpPr>
         <p:spPr/>
         <p:txBody>
-          <a:bodyPr>
-            <a:normAutofit/>
-          </a:bodyPr>
-          <a:lstStyle/>
-          <a:p>
-            <a:r>
-              <a:rPr lang="de-DE" dirty="0" smtClean="0"/>
-              <a:t>UML </a:t>
-            </a:r>
+          <a:bodyPr/>
+          <a:lstStyle/>
+          <a:p>
+            <a:r>
+              <a:rPr lang="de-DE" dirty="0" smtClean="0"/>
+              <a:t>Ziel des Projekts </a:t>
+            </a:r>
+            <a:r>
+              <a:rPr lang="de-DE" dirty="0" err="1" smtClean="0"/>
+              <a:t>Eventalizer</a:t>
+            </a:r>
+            <a:r>
+              <a:rPr lang="de-DE" dirty="0" smtClean="0"/>
+              <a:t> ist die </a:t>
+            </a:r>
+            <a:r>
+              <a:rPr lang="de-DE" sz="1200" i="1" kern="1200" dirty="0" smtClean="0">
+                <a:solidFill>
+                  <a:schemeClr val="tx1"/>
+                </a:solidFill>
+                <a:effectLst/>
+                <a:latin typeface="+mn-lt"/>
+                <a:ea typeface="+mn-ea"/>
+                <a:cs typeface="+mn-cs"/>
+              </a:rPr>
+              <a:t>Erstellung einer webbasierten Plattform zur nutzerzentrierten</a:t>
+            </a:r>
+            <a:r>
+              <a:rPr lang="de-DE" sz="1200" i="1" kern="1200" baseline="0" dirty="0" smtClean="0">
+                <a:solidFill>
+                  <a:schemeClr val="tx1"/>
+                </a:solidFill>
+                <a:effectLst/>
+                <a:latin typeface="+mn-lt"/>
+                <a:ea typeface="+mn-ea"/>
+                <a:cs typeface="+mn-cs"/>
+              </a:rPr>
+              <a:t> </a:t>
+            </a:r>
+            <a:r>
+              <a:rPr lang="de-DE" sz="1200" i="1" kern="1200" dirty="0" smtClean="0">
+                <a:solidFill>
+                  <a:schemeClr val="tx1"/>
+                </a:solidFill>
+                <a:effectLst/>
+                <a:latin typeface="+mn-lt"/>
+                <a:ea typeface="+mn-ea"/>
+                <a:cs typeface="+mn-cs"/>
+              </a:rPr>
+              <a:t>Organisation von nicht kommerziellen gemeinschaftlichen Freizeitaktivitäten.</a:t>
+            </a:r>
+          </a:p>
+          <a:p>
             <a:endParaRPr lang="de-DE" dirty="0"/>
           </a:p>
         </p:txBody>
@@ -3456,13 +3500,18 @@
             <a:fld id="{1EBFF01C-F984-4A51-AF10-254043F7C542}" type="slidenum">
               <a:rPr lang="de-DE" smtClean="0"/>
               <a:pPr/>
-              <a:t>4</a:t>
+              <a:t>3</a:t>
             </a:fld>
             <a:endParaRPr lang="de-DE"/>
           </a:p>
         </p:txBody>
       </p:sp>
     </p:spTree>
+    <p:extLst>
+      <p:ext uri="{BB962C8B-B14F-4D97-AF65-F5344CB8AC3E}">
+        <p14:creationId xmlns:p14="http://schemas.microsoft.com/office/powerpoint/2010/main" val="3860513045"/>
+      </p:ext>
+    </p:extLst>
   </p:cSld>
   <p:clrMapOvr>
     <a:masterClrMapping/>
@@ -3516,6 +3565,10 @@
           </a:bodyPr>
           <a:lstStyle/>
           <a:p>
+            <a:r>
+              <a:rPr lang="de-DE" dirty="0" smtClean="0"/>
+              <a:t>UML </a:t>
+            </a:r>
             <a:endParaRPr lang="de-DE" dirty="0"/>
           </a:p>
         </p:txBody>
@@ -3538,7 +3591,7 @@
             <a:fld id="{1EBFF01C-F984-4A51-AF10-254043F7C542}" type="slidenum">
               <a:rPr lang="de-DE" smtClean="0"/>
               <a:pPr/>
-              <a:t>18</a:t>
+              <a:t>4</a:t>
             </a:fld>
             <a:endParaRPr lang="de-DE"/>
           </a:p>
@@ -3598,46 +3651,6 @@
           </a:bodyPr>
           <a:lstStyle/>
           <a:p>
-            <a:r>
-              <a:rPr lang="de-DE" dirty="0" smtClean="0"/>
-              <a:t>Grundlegende </a:t>
-            </a:r>
-            <a:r>
-              <a:rPr lang="de-DE" dirty="0" err="1" smtClean="0"/>
-              <a:t>Risikoanlayse</a:t>
-            </a:r>
-            <a:r>
-              <a:rPr lang="de-DE" baseline="0" dirty="0" smtClean="0"/>
-              <a:t> durchgeführt</a:t>
-            </a:r>
-          </a:p>
-          <a:p>
-            <a:r>
-              <a:rPr lang="de-DE" baseline="0" dirty="0" smtClean="0"/>
-              <a:t> - Risiken Identifiziert und klassifiziert (Eintrittswahrscheinlichkeit und Auswirkungen)</a:t>
-            </a:r>
-          </a:p>
-          <a:p>
-            <a:r>
-              <a:rPr lang="de-DE" baseline="0" dirty="0" smtClean="0"/>
-              <a:t>    - betreffen Mitarbeiter und technische Probleme</a:t>
-            </a:r>
-          </a:p>
-          <a:p>
-            <a:endParaRPr lang="de-DE" baseline="0" dirty="0" smtClean="0"/>
-          </a:p>
-          <a:p>
-            <a:r>
-              <a:rPr lang="de-DE" dirty="0" smtClean="0"/>
-              <a:t> - Fokussierung der</a:t>
-            </a:r>
-            <a:r>
-              <a:rPr lang="de-DE" baseline="0" dirty="0" smtClean="0"/>
-              <a:t> Veranstaltung auf SoftwareEntwicklungsProzess, daher nicht weiter vertieft.</a:t>
-            </a:r>
-            <a:endParaRPr lang="de-DE" dirty="0" smtClean="0"/>
-          </a:p>
-          <a:p>
             <a:endParaRPr lang="de-DE" dirty="0"/>
           </a:p>
         </p:txBody>
@@ -3660,7 +3673,7 @@
             <a:fld id="{1EBFF01C-F984-4A51-AF10-254043F7C542}" type="slidenum">
               <a:rPr lang="de-DE" smtClean="0"/>
               <a:pPr/>
-              <a:t>19</a:t>
+              <a:t>18</a:t>
             </a:fld>
             <a:endParaRPr lang="de-DE"/>
           </a:p>
@@ -3722,135 +3735,44 @@
           <a:p>
             <a:r>
               <a:rPr lang="de-DE" dirty="0" smtClean="0"/>
-              <a:t>Definieren</a:t>
+              <a:t>Grundlegende </a:t>
+            </a:r>
+            <a:r>
+              <a:rPr lang="de-DE" dirty="0" err="1" smtClean="0"/>
+              <a:t>Risikoanlayse</a:t>
             </a:r>
             <a:r>
               <a:rPr lang="de-DE" baseline="0" dirty="0" smtClean="0"/>
-              <a:t> von zwei Szenarien mit Hilfe von </a:t>
-            </a:r>
-            <a:r>
-              <a:rPr lang="de-DE" baseline="0" dirty="0" err="1" smtClean="0"/>
-              <a:t>Personae</a:t>
-            </a:r>
+              <a:t> durchgeführt</a:t>
+            </a:r>
+          </a:p>
+          <a:p>
+            <a:r>
+              <a:rPr lang="de-DE" baseline="0" dirty="0" smtClean="0"/>
+              <a:t> - Risiken Identifiziert und klassifiziert (Eintrittswahrscheinlichkeit und Auswirkungen)</a:t>
+            </a:r>
+          </a:p>
+          <a:p>
+            <a:r>
+              <a:rPr lang="de-DE" baseline="0" dirty="0" smtClean="0"/>
+              <a:t>    - betreffen Mitarbeiter und technische Probleme</a:t>
+            </a:r>
+          </a:p>
+          <a:p>
             <a:endParaRPr lang="de-DE" baseline="0" dirty="0" smtClean="0"/>
           </a:p>
           <a:p>
             <a:r>
+              <a:rPr lang="de-DE" dirty="0" smtClean="0"/>
+              <a:t> - Fokussierung der</a:t>
+            </a:r>
+            <a:r>
               <a:rPr lang="de-DE" baseline="0" dirty="0" smtClean="0"/>
-              <a:t>Im Prinzip wird die gleiche Geschichte einmal aus Sicht des Event-Organisators</a:t>
-            </a:r>
-          </a:p>
-          <a:p>
-            <a:r>
-              <a:rPr lang="de-DE" baseline="0" dirty="0" smtClean="0"/>
-              <a:t>„Martin erstellt einen Event zum Go-Kart-Fahren“</a:t>
-            </a:r>
-          </a:p>
-          <a:p>
-            <a:r>
-              <a:rPr lang="de-DE" baseline="0" dirty="0" smtClean="0"/>
-              <a:t>Einmal aus Sicht des Event-Teilnehmers „Patrick nimmt an diesem Event teil“</a:t>
-            </a:r>
-          </a:p>
-          <a:p>
-            <a:endParaRPr lang="de-DE" baseline="0" dirty="0" smtClean="0"/>
-          </a:p>
-          <a:p>
-            <a:r>
-              <a:rPr lang="de-DE" baseline="0" dirty="0" smtClean="0"/>
-              <a:t>Charaktere „Martin“ und „Patrick“ Prototypen von Nutzern</a:t>
-            </a:r>
-          </a:p>
-          <a:p>
-            <a:r>
-              <a:rPr lang="de-DE" baseline="0" dirty="0" smtClean="0"/>
-              <a:t>Go-Kart-Fahren als ein Prototyp für Gruppenevents</a:t>
-            </a:r>
-          </a:p>
-          <a:p>
-            <a:endParaRPr lang="de-DE" baseline="0" dirty="0" smtClean="0"/>
-          </a:p>
-          <a:p>
-            <a:r>
-              <a:rPr lang="de-DE" baseline="0" dirty="0" err="1" smtClean="0"/>
-              <a:t>Erkenntnise</a:t>
-            </a:r>
-            <a:r>
-              <a:rPr lang="de-DE" baseline="0" dirty="0" smtClean="0"/>
-              <a:t>:</a:t>
-            </a:r>
-          </a:p>
-          <a:p>
-            <a:r>
-              <a:rPr lang="de-DE" baseline="0" dirty="0" smtClean="0"/>
-              <a:t>Neue Fragenstellungen zu Funktionen, Anforderungen, Unterstützung bei der Lastenheft- und </a:t>
-            </a:r>
-            <a:r>
-              <a:rPr lang="de-DE" baseline="0" dirty="0" err="1" smtClean="0"/>
-              <a:t>Use</a:t>
-            </a:r>
-            <a:r>
-              <a:rPr lang="de-DE" baseline="0" smtClean="0"/>
-              <a:t>-Case-Erstellung</a:t>
-            </a:r>
-            <a:endParaRPr lang="de-DE" baseline="0" dirty="0" smtClean="0"/>
-          </a:p>
-          <a:p>
-            <a:endParaRPr lang="de-DE" baseline="0" dirty="0" smtClean="0"/>
-          </a:p>
-          <a:p>
-            <a:pPr>
-              <a:buFont typeface="Symbol"/>
-              <a:buChar char="Þ"/>
-            </a:pPr>
-            <a:r>
-              <a:rPr lang="de-DE" baseline="0" dirty="0" smtClean="0"/>
-              <a:t>Aktionen / Operationen</a:t>
-            </a:r>
-          </a:p>
-          <a:p>
-            <a:pPr>
-              <a:buFont typeface="Symbol"/>
-              <a:buChar char="Þ"/>
-            </a:pPr>
-            <a:endParaRPr lang="de-DE" baseline="0" dirty="0" smtClean="0"/>
-          </a:p>
-          <a:p>
-            <a:pPr>
-              <a:buFont typeface="Symbol"/>
-              <a:buNone/>
-            </a:pPr>
-            <a:r>
-              <a:rPr lang="de-DE" baseline="0" dirty="0" smtClean="0"/>
-              <a:t>Entspricht bei UML</a:t>
-            </a:r>
-          </a:p>
-          <a:p>
-            <a:pPr>
-              <a:buFont typeface="Symbol"/>
-              <a:buChar char="Þ"/>
-            </a:pPr>
-            <a:r>
-              <a:rPr lang="de-DE" baseline="0" dirty="0" smtClean="0"/>
-              <a:t>Akteur </a:t>
-            </a:r>
-          </a:p>
-          <a:p>
-            <a:pPr>
-              <a:buFont typeface="Symbol"/>
-              <a:buChar char="Þ"/>
-            </a:pPr>
-            <a:r>
-              <a:rPr lang="de-DE" baseline="0" dirty="0" err="1" smtClean="0"/>
-              <a:t>UseCase</a:t>
-            </a:r>
-            <a:endParaRPr lang="de-DE" baseline="0" dirty="0" smtClean="0"/>
-          </a:p>
-          <a:p>
-            <a:pPr>
-              <a:buFont typeface="Symbol"/>
-              <a:buNone/>
-            </a:pPr>
+              <a:t> Veranstaltung auf SoftwareEntwicklungsProzess, daher nicht weiter vertieft.</a:t>
+            </a:r>
+            <a:endParaRPr lang="de-DE" dirty="0" smtClean="0"/>
+          </a:p>
+          <a:p>
             <a:endParaRPr lang="de-DE" dirty="0"/>
           </a:p>
         </p:txBody>
@@ -3873,7 +3795,7 @@
             <a:fld id="{1EBFF01C-F984-4A51-AF10-254043F7C542}" type="slidenum">
               <a:rPr lang="de-DE" smtClean="0"/>
               <a:pPr/>
-              <a:t>23</a:t>
+              <a:t>19</a:t>
             </a:fld>
             <a:endParaRPr lang="de-DE"/>
           </a:p>
@@ -3935,26 +3857,136 @@
           <a:p>
             <a:r>
               <a:rPr lang="de-DE" dirty="0" smtClean="0"/>
-              <a:t>Beispiel: Domänenklassendiagramm in</a:t>
+              <a:t>Definieren</a:t>
             </a:r>
             <a:r>
               <a:rPr lang="de-DE" baseline="0" dirty="0" smtClean="0"/>
-              <a:t> Anwendung gießen</a:t>
-            </a:r>
+              <a:t> von zwei Szenarien mit Hilfe von </a:t>
+            </a:r>
+            <a:r>
+              <a:rPr lang="de-DE" baseline="0" dirty="0" err="1" smtClean="0"/>
+              <a:t>Personae</a:t>
+            </a:r>
+            <a:endParaRPr lang="de-DE" baseline="0" dirty="0" smtClean="0"/>
           </a:p>
           <a:p>
             <a:r>
               <a:rPr lang="de-DE" baseline="0" dirty="0" smtClean="0"/>
-              <a:t>Technische Mock-</a:t>
-            </a:r>
+              <a:t>Im Prinzip wird die gleiche Geschichte einmal aus Sicht des Event-Organisators</a:t>
+            </a:r>
+          </a:p>
+          <a:p>
+            <a:r>
+              <a:rPr lang="de-DE" baseline="0" dirty="0" smtClean="0"/>
+              <a:t>„Martin erstellt einen Event zum Go-Kart-Fahren“</a:t>
+            </a:r>
+          </a:p>
+          <a:p>
+            <a:r>
+              <a:rPr lang="de-DE" baseline="0" dirty="0" smtClean="0"/>
+              <a:t>Einmal aus Sicht des Event-Teilnehmers „Patrick nimmt an diesem Event teil“</a:t>
+            </a:r>
+          </a:p>
+          <a:p>
+            <a:endParaRPr lang="de-DE" baseline="0" dirty="0" smtClean="0"/>
+          </a:p>
+          <a:p>
+            <a:r>
+              <a:rPr lang="de-DE" baseline="0" dirty="0" smtClean="0"/>
+              <a:t>Charaktere „Martin“ und „Patrick“ Prototypen von Nutzern</a:t>
+            </a:r>
+          </a:p>
+          <a:p>
+            <a:r>
+              <a:rPr lang="de-DE" baseline="0" dirty="0" smtClean="0"/>
+              <a:t>Go-Kart-Fahren als ein Prototyp für Gruppenevents</a:t>
+            </a:r>
+          </a:p>
+          <a:p>
+            <a:endParaRPr lang="de-DE" baseline="0" dirty="0" smtClean="0"/>
+          </a:p>
+          <a:p>
             <a:r>
               <a:rPr lang="de-DE" baseline="0" dirty="0" err="1" smtClean="0"/>
-              <a:t>Ups</a:t>
+              <a:t>Erkenntnise</a:t>
             </a:r>
             <a:r>
               <a:rPr lang="de-DE" baseline="0" dirty="0" smtClean="0"/>
-              <a:t> im Browser zeigen</a:t>
-            </a:r>
+              <a:t>:</a:t>
+            </a:r>
+          </a:p>
+          <a:p>
+            <a:r>
+              <a:rPr lang="de-DE" baseline="0" dirty="0" smtClean="0"/>
+              <a:t>Neue Fragenstellungen zu Funktionen, Anforderungen, Unterstützung bei der Lastenheft- und </a:t>
+            </a:r>
+            <a:r>
+              <a:rPr lang="de-DE" baseline="0" dirty="0" err="1" smtClean="0"/>
+              <a:t>Use</a:t>
+            </a:r>
+            <a:r>
+              <a:rPr lang="de-DE" baseline="0" smtClean="0"/>
+              <a:t>-Case-Erstellung</a:t>
+            </a:r>
+            <a:endParaRPr lang="de-DE" baseline="0" dirty="0" smtClean="0"/>
+          </a:p>
+          <a:p>
+            <a:endParaRPr lang="de-DE" baseline="0" dirty="0" smtClean="0"/>
+          </a:p>
+          <a:p>
+            <a:pPr>
+              <a:buFont typeface="Symbol"/>
+              <a:buChar char="Þ"/>
+            </a:pPr>
+            <a:r>
+              <a:rPr lang="de-DE" baseline="0" dirty="0" smtClean="0"/>
+              <a:t>Aktionen / Operationen</a:t>
+            </a:r>
+          </a:p>
+          <a:p>
+            <a:pPr>
+              <a:buFont typeface="Symbol"/>
+              <a:buChar char="Þ"/>
+            </a:pPr>
+            <a:endParaRPr lang="de-DE" baseline="0" dirty="0" smtClean="0"/>
+          </a:p>
+          <a:p>
+            <a:pPr>
+              <a:buFont typeface="Symbol"/>
+              <a:buNone/>
+            </a:pPr>
+            <a:r>
+              <a:rPr lang="de-DE" baseline="0" dirty="0" smtClean="0"/>
+              <a:t>Entspricht bei UML</a:t>
+            </a:r>
+          </a:p>
+          <a:p>
+            <a:pPr>
+              <a:buFont typeface="Symbol"/>
+              <a:buChar char="Þ"/>
+            </a:pPr>
+            <a:r>
+              <a:rPr lang="de-DE" baseline="0" dirty="0" smtClean="0"/>
+              <a:t>Akteur </a:t>
+            </a:r>
+          </a:p>
+          <a:p>
+            <a:pPr>
+              <a:buFont typeface="Symbol"/>
+              <a:buChar char="Þ"/>
+            </a:pPr>
+            <a:r>
+              <a:rPr lang="de-DE" baseline="0" dirty="0" err="1" smtClean="0"/>
+              <a:t>UseCase</a:t>
+            </a:r>
+            <a:endParaRPr lang="de-DE" baseline="0" dirty="0" smtClean="0"/>
+          </a:p>
+          <a:p>
+            <a:pPr>
+              <a:buFont typeface="Symbol"/>
+              <a:buNone/>
+            </a:pPr>
+            <a:endParaRPr lang="de-DE" dirty="0"/>
           </a:p>
         </p:txBody>
       </p:sp>
@@ -3976,7 +4008,7 @@
             <a:fld id="{1EBFF01C-F984-4A51-AF10-254043F7C542}" type="slidenum">
               <a:rPr lang="de-DE" smtClean="0"/>
               <a:pPr/>
-              <a:t>26</a:t>
+              <a:t>23</a:t>
             </a:fld>
             <a:endParaRPr lang="de-DE"/>
           </a:p>
@@ -3991,6 +4023,109 @@
 </file>
 
 <file path=ppt/notesSlides/notesSlide6.xml><?xml version="1.0" encoding="utf-8"?>
+<p:notes xmlns:a="http://schemas.openxmlformats.org/drawingml/2006/main" xmlns:r="http://schemas.openxmlformats.org/officeDocument/2006/relationships" xmlns:p="http://schemas.openxmlformats.org/presentationml/2006/main">
+  <p:cSld>
+    <p:spTree>
+      <p:nvGrpSpPr>
+        <p:cNvPr id="1" name=""/>
+        <p:cNvGrpSpPr/>
+        <p:nvPr/>
+      </p:nvGrpSpPr>
+      <p:grpSpPr>
+        <a:xfrm>
+          <a:off x="0" y="0"/>
+          <a:ext cx="0" cy="0"/>
+          <a:chOff x="0" y="0"/>
+          <a:chExt cx="0" cy="0"/>
+        </a:xfrm>
+      </p:grpSpPr>
+      <p:sp>
+        <p:nvSpPr>
+          <p:cNvPr id="2" name="Folienbildplatzhalter 1"/>
+          <p:cNvSpPr>
+            <a:spLocks noGrp="1" noRot="1" noChangeAspect="1"/>
+          </p:cNvSpPr>
+          <p:nvPr>
+            <p:ph type="sldImg"/>
+          </p:nvPr>
+        </p:nvSpPr>
+        <p:spPr/>
+      </p:sp>
+      <p:sp>
+        <p:nvSpPr>
+          <p:cNvPr id="3" name="Notizenplatzhalter 2"/>
+          <p:cNvSpPr>
+            <a:spLocks noGrp="1"/>
+          </p:cNvSpPr>
+          <p:nvPr>
+            <p:ph type="body" idx="1"/>
+          </p:nvPr>
+        </p:nvSpPr>
+        <p:spPr/>
+        <p:txBody>
+          <a:bodyPr>
+            <a:normAutofit/>
+          </a:bodyPr>
+          <a:lstStyle/>
+          <a:p>
+            <a:r>
+              <a:rPr lang="de-DE" dirty="0" smtClean="0"/>
+              <a:t>Beispiel: Domänenklassendiagramm in</a:t>
+            </a:r>
+            <a:r>
+              <a:rPr lang="de-DE" baseline="0" dirty="0" smtClean="0"/>
+              <a:t> Anwendung gießen</a:t>
+            </a:r>
+          </a:p>
+          <a:p>
+            <a:r>
+              <a:rPr lang="de-DE" baseline="0" dirty="0" smtClean="0"/>
+              <a:t>Technische Mock-</a:t>
+            </a:r>
+            <a:r>
+              <a:rPr lang="de-DE" baseline="0" dirty="0" err="1" smtClean="0"/>
+              <a:t>Ups</a:t>
+            </a:r>
+            <a:r>
+              <a:rPr lang="de-DE" baseline="0" dirty="0" smtClean="0"/>
+              <a:t> im Browser zeigen</a:t>
+            </a:r>
+          </a:p>
+        </p:txBody>
+      </p:sp>
+      <p:sp>
+        <p:nvSpPr>
+          <p:cNvPr id="4" name="Foliennummernplatzhalter 3"/>
+          <p:cNvSpPr>
+            <a:spLocks noGrp="1"/>
+          </p:cNvSpPr>
+          <p:nvPr>
+            <p:ph type="sldNum" sz="quarter" idx="10"/>
+          </p:nvPr>
+        </p:nvSpPr>
+        <p:spPr/>
+        <p:txBody>
+          <a:bodyPr/>
+          <a:lstStyle/>
+          <a:p>
+            <a:fld id="{1EBFF01C-F984-4A51-AF10-254043F7C542}" type="slidenum">
+              <a:rPr lang="de-DE" smtClean="0"/>
+              <a:pPr/>
+              <a:t>26</a:t>
+            </a:fld>
+            <a:endParaRPr lang="de-DE"/>
+          </a:p>
+        </p:txBody>
+      </p:sp>
+    </p:spTree>
+  </p:cSld>
+  <p:clrMapOvr>
+    <a:masterClrMapping/>
+  </p:clrMapOvr>
+</p:notes>
+</file>
+
+<file path=ppt/notesSlides/notesSlide7.xml><?xml version="1.0" encoding="utf-8"?>
 <p:notes xmlns:a="http://schemas.openxmlformats.org/drawingml/2006/main" xmlns:r="http://schemas.openxmlformats.org/officeDocument/2006/relationships" xmlns:p="http://schemas.openxmlformats.org/presentationml/2006/main">
   <p:cSld>
     <p:spTree>
@@ -6923,7 +7058,7 @@
             <a:lum/>
             <a:extLst>
               <a:ext uri="{28A0092B-C50C-407E-A947-70E740481C1C}">
-                <a14:useLocalDpi xmlns:a14="http://schemas.microsoft.com/office/drawing/2010/main" xmlns="" val="0"/>
+                <a14:useLocalDpi xmlns:a14="http://schemas.microsoft.com/office/drawing/2010/main" val="0"/>
               </a:ext>
             </a:extLst>
           </a:blip>
@@ -10513,7 +10648,7 @@
           <a:blip r:embed="rId4" cstate="print">
             <a:extLst>
               <a:ext uri="{BEBA8EAE-BF5A-486C-A8C5-ECC9F3942E4B}">
-                <a14:imgProps xmlns:a14="http://schemas.microsoft.com/office/drawing/2010/main" xmlns="">
+                <a14:imgProps xmlns:a14="http://schemas.microsoft.com/office/drawing/2010/main">
                   <a14:imgLayer r:embed="rId5">
                     <a14:imgEffect>
                       <a14:colorTemperature colorTemp="11200"/>
@@ -10550,7 +10685,7 @@
     </p:spTree>
     <p:extLst>
       <p:ext uri="{BB962C8B-B14F-4D97-AF65-F5344CB8AC3E}">
-        <p14:creationId xmlns:p14="http://schemas.microsoft.com/office/powerpoint/2010/main" xmlns="" val="3440238054"/>
+        <p14:creationId xmlns:p14="http://schemas.microsoft.com/office/powerpoint/2010/main" val="3440238054"/>
       </p:ext>
     </p:extLst>
   </p:cSld>
@@ -11353,6 +11488,7 @@
               <a:rPr lang="de-DE" dirty="0" smtClean="0"/>
               <a:t>Freizeitaktivitäten</a:t>
             </a:r>
+            <a:endParaRPr lang="de-DE" dirty="0" smtClean="0"/>
           </a:p>
           <a:p>
             <a:r>
@@ -11405,7 +11541,7 @@
           <p:nvPr/>
         </p:nvPicPr>
         <p:blipFill>
-          <a:blip r:embed="rId2" cstate="print">
+          <a:blip r:embed="rId3" cstate="print">
             <a:clrChange>
               <a:clrFrom>
                 <a:srgbClr val="FCFCFA"/>

</xml_diff>